<commit_message>
Updated ppt since the scoreboard changed
</commit_message>
<xml_diff>
--- a/MiniProject2/MP2_COMP_472.pptx
+++ b/MiniProject2/MP2_COMP_472.pptx
@@ -267,7 +267,7 @@
           <a:p>
             <a:fld id="{2B47ED45-BBBB-48FB-83DA-3ED961A40FA4}" type="datetimeFigureOut">
               <a:rPr lang="en-CA" smtClean="0"/>
-              <a:t>15/11/2021</a:t>
+              <a:t>2021-11-15</a:t>
             </a:fld>
             <a:endParaRPr lang="en-CA"/>
           </a:p>
@@ -467,7 +467,7 @@
           <a:p>
             <a:fld id="{2B47ED45-BBBB-48FB-83DA-3ED961A40FA4}" type="datetimeFigureOut">
               <a:rPr lang="en-CA" smtClean="0"/>
-              <a:t>15/11/2021</a:t>
+              <a:t>2021-11-15</a:t>
             </a:fld>
             <a:endParaRPr lang="en-CA"/>
           </a:p>
@@ -677,7 +677,7 @@
           <a:p>
             <a:fld id="{2B47ED45-BBBB-48FB-83DA-3ED961A40FA4}" type="datetimeFigureOut">
               <a:rPr lang="en-CA" smtClean="0"/>
-              <a:t>15/11/2021</a:t>
+              <a:t>2021-11-15</a:t>
             </a:fld>
             <a:endParaRPr lang="en-CA"/>
           </a:p>
@@ -877,7 +877,7 @@
           <a:p>
             <a:fld id="{2B47ED45-BBBB-48FB-83DA-3ED961A40FA4}" type="datetimeFigureOut">
               <a:rPr lang="en-CA" smtClean="0"/>
-              <a:t>15/11/2021</a:t>
+              <a:t>2021-11-15</a:t>
             </a:fld>
             <a:endParaRPr lang="en-CA"/>
           </a:p>
@@ -1153,7 +1153,7 @@
           <a:p>
             <a:fld id="{2B47ED45-BBBB-48FB-83DA-3ED961A40FA4}" type="datetimeFigureOut">
               <a:rPr lang="en-CA" smtClean="0"/>
-              <a:t>15/11/2021</a:t>
+              <a:t>2021-11-15</a:t>
             </a:fld>
             <a:endParaRPr lang="en-CA"/>
           </a:p>
@@ -1421,7 +1421,7 @@
           <a:p>
             <a:fld id="{2B47ED45-BBBB-48FB-83DA-3ED961A40FA4}" type="datetimeFigureOut">
               <a:rPr lang="en-CA" smtClean="0"/>
-              <a:t>15/11/2021</a:t>
+              <a:t>2021-11-15</a:t>
             </a:fld>
             <a:endParaRPr lang="en-CA"/>
           </a:p>
@@ -1836,7 +1836,7 @@
           <a:p>
             <a:fld id="{2B47ED45-BBBB-48FB-83DA-3ED961A40FA4}" type="datetimeFigureOut">
               <a:rPr lang="en-CA" smtClean="0"/>
-              <a:t>15/11/2021</a:t>
+              <a:t>2021-11-15</a:t>
             </a:fld>
             <a:endParaRPr lang="en-CA"/>
           </a:p>
@@ -1978,7 +1978,7 @@
           <a:p>
             <a:fld id="{2B47ED45-BBBB-48FB-83DA-3ED961A40FA4}" type="datetimeFigureOut">
               <a:rPr lang="en-CA" smtClean="0"/>
-              <a:t>15/11/2021</a:t>
+              <a:t>2021-11-15</a:t>
             </a:fld>
             <a:endParaRPr lang="en-CA"/>
           </a:p>
@@ -2091,7 +2091,7 @@
           <a:p>
             <a:fld id="{2B47ED45-BBBB-48FB-83DA-3ED961A40FA4}" type="datetimeFigureOut">
               <a:rPr lang="en-CA" smtClean="0"/>
-              <a:t>15/11/2021</a:t>
+              <a:t>2021-11-15</a:t>
             </a:fld>
             <a:endParaRPr lang="en-CA"/>
           </a:p>
@@ -2404,7 +2404,7 @@
           <a:p>
             <a:fld id="{2B47ED45-BBBB-48FB-83DA-3ED961A40FA4}" type="datetimeFigureOut">
               <a:rPr lang="en-CA" smtClean="0"/>
-              <a:t>15/11/2021</a:t>
+              <a:t>2021-11-15</a:t>
             </a:fld>
             <a:endParaRPr lang="en-CA"/>
           </a:p>
@@ -2693,7 +2693,7 @@
           <a:p>
             <a:fld id="{2B47ED45-BBBB-48FB-83DA-3ED961A40FA4}" type="datetimeFigureOut">
               <a:rPr lang="en-CA" smtClean="0"/>
-              <a:t>15/11/2021</a:t>
+              <a:t>2021-11-15</a:t>
             </a:fld>
             <a:endParaRPr lang="en-CA"/>
           </a:p>
@@ -2936,7 +2936,7 @@
           <a:p>
             <a:fld id="{2B47ED45-BBBB-48FB-83DA-3ED961A40FA4}" type="datetimeFigureOut">
               <a:rPr lang="en-CA" smtClean="0"/>
-              <a:t>15/11/2021</a:t>
+              <a:t>2021-11-15</a:t>
             </a:fld>
             <a:endParaRPr lang="en-CA"/>
           </a:p>
@@ -5906,7 +5906,7 @@
           <a:lstStyle/>
           <a:p>
             <a:r>
-              <a:rPr lang="en-CA" sz="4000" dirty="0"/>
+              <a:rPr lang="en-CA" sz="4800" dirty="0"/>
               <a:t>Scoreboard Run</a:t>
             </a:r>
           </a:p>
@@ -5936,7 +5936,7 @@
         </p:spPr>
         <p:txBody>
           <a:bodyPr>
-            <a:normAutofit fontScale="55000" lnSpcReduction="20000"/>
+            <a:normAutofit/>
           </a:bodyPr>
           <a:lstStyle/>
           <a:p>
@@ -5946,99 +5946,9 @@
               </a:lnSpc>
             </a:pPr>
             <a:r>
-              <a:rPr lang="en-CA" sz="3300" dirty="0"/>
-              <a:t>Configuration 1 for 10 runs</a:t>
+              <a:rPr lang="en-CA" sz="3600" dirty="0"/>
+              <a:t>10 runs of each configuration outlines in the handout</a:t>
             </a:r>
-          </a:p>
-          <a:p>
-            <a:pPr lvl="1">
-              <a:lnSpc>
-                <a:spcPct val="100000"/>
-              </a:lnSpc>
-            </a:pPr>
-            <a:r>
-              <a:rPr lang="en-CA" sz="3300" dirty="0"/>
-              <a:t>board size of 4</a:t>
-            </a:r>
-          </a:p>
-          <a:p>
-            <a:pPr lvl="1">
-              <a:lnSpc>
-                <a:spcPct val="100000"/>
-              </a:lnSpc>
-            </a:pPr>
-            <a:r>
-              <a:rPr lang="en-CA" sz="3300" dirty="0"/>
-              <a:t>4 blocks placed at [(0,0),(0,4),(4,0),(4,4)]</a:t>
-            </a:r>
-          </a:p>
-          <a:p>
-            <a:pPr lvl="1">
-              <a:lnSpc>
-                <a:spcPct val="100000"/>
-              </a:lnSpc>
-            </a:pPr>
-            <a:r>
-              <a:rPr lang="en-CA" sz="3300" dirty="0"/>
-              <a:t>max depths at 6</a:t>
-            </a:r>
-          </a:p>
-          <a:p>
-            <a:pPr lvl="1">
-              <a:lnSpc>
-                <a:spcPct val="100000"/>
-              </a:lnSpc>
-            </a:pPr>
-            <a:r>
-              <a:rPr lang="en-CA" sz="3300" dirty="0"/>
-              <a:t>winning line size of 3</a:t>
-            </a:r>
-          </a:p>
-          <a:p>
-            <a:pPr lvl="1">
-              <a:lnSpc>
-                <a:spcPct val="100000"/>
-              </a:lnSpc>
-            </a:pPr>
-            <a:r>
-              <a:rPr lang="en-CA" sz="3300" dirty="0"/>
-              <a:t>max time to think at 5 seconds</a:t>
-            </a:r>
-          </a:p>
-          <a:p>
-            <a:pPr lvl="1">
-              <a:lnSpc>
-                <a:spcPct val="100000"/>
-              </a:lnSpc>
-            </a:pPr>
-            <a:r>
-              <a:rPr lang="en-CA" sz="3300" dirty="0"/>
-              <a:t>using </a:t>
-            </a:r>
-            <a:r>
-              <a:rPr lang="en-CA" sz="3300" dirty="0" err="1"/>
-              <a:t>MiniMax</a:t>
-            </a:r>
-            <a:endParaRPr lang="en-CA" sz="3300" dirty="0"/>
-          </a:p>
-          <a:p>
-            <a:pPr lvl="1">
-              <a:lnSpc>
-                <a:spcPct val="100000"/>
-              </a:lnSpc>
-            </a:pPr>
-            <a:r>
-              <a:rPr lang="en-CA" sz="3300" dirty="0"/>
-              <a:t>player 1 using e1() and player 2 using e2()</a:t>
-            </a:r>
-          </a:p>
-          <a:p>
-            <a:pPr lvl="1">
-              <a:lnSpc>
-                <a:spcPct val="100000"/>
-              </a:lnSpc>
-            </a:pPr>
-            <a:endParaRPr lang="en-CA" sz="3300" dirty="0"/>
           </a:p>
           <a:p>
             <a:pPr>
@@ -6047,94 +5957,20 @@
               </a:lnSpc>
             </a:pPr>
             <a:r>
-              <a:rPr lang="en-CA" sz="3300" dirty="0"/>
-              <a:t> Configuration 2 for 10 runs</a:t>
+              <a:rPr lang="en-CA" sz="3600" dirty="0"/>
+              <a:t>Each heuristic swaps player after 5 round, e1 plays first for 5 games and then e2 plays first for 5 games</a:t>
             </a:r>
           </a:p>
           <a:p>
-            <a:pPr lvl="1">
+            <a:pPr>
               <a:lnSpc>
                 <a:spcPct val="100000"/>
               </a:lnSpc>
             </a:pPr>
             <a:r>
-              <a:rPr lang="en-CA" sz="3300" dirty="0"/>
-              <a:t>board size of 4</a:t>
+              <a:rPr lang="en-CA" sz="3600" dirty="0"/>
+              <a:t>Results of each configuration is then stored in scoreboard.txt</a:t>
             </a:r>
-          </a:p>
-          <a:p>
-            <a:pPr lvl="1">
-              <a:lnSpc>
-                <a:spcPct val="100000"/>
-              </a:lnSpc>
-            </a:pPr>
-            <a:r>
-              <a:rPr lang="en-CA" sz="3300" dirty="0"/>
-              <a:t>4 blocks placed at [(0,0),(0,4),(4,0),(4,4)]</a:t>
-            </a:r>
-          </a:p>
-          <a:p>
-            <a:pPr lvl="1">
-              <a:lnSpc>
-                <a:spcPct val="100000"/>
-              </a:lnSpc>
-            </a:pPr>
-            <a:r>
-              <a:rPr lang="en-CA" sz="3300" dirty="0"/>
-              <a:t>max depths at 6</a:t>
-            </a:r>
-          </a:p>
-          <a:p>
-            <a:pPr lvl="1">
-              <a:lnSpc>
-                <a:spcPct val="100000"/>
-              </a:lnSpc>
-            </a:pPr>
-            <a:r>
-              <a:rPr lang="en-CA" sz="3300" dirty="0"/>
-              <a:t>winning line size of 3</a:t>
-            </a:r>
-          </a:p>
-          <a:p>
-            <a:pPr lvl="1">
-              <a:lnSpc>
-                <a:spcPct val="100000"/>
-              </a:lnSpc>
-            </a:pPr>
-            <a:r>
-              <a:rPr lang="en-CA" sz="3300" dirty="0"/>
-              <a:t>max time to think at 1 second</a:t>
-            </a:r>
-          </a:p>
-          <a:p>
-            <a:pPr lvl="1">
-              <a:lnSpc>
-                <a:spcPct val="100000"/>
-              </a:lnSpc>
-            </a:pPr>
-            <a:r>
-              <a:rPr lang="en-CA" sz="3300" dirty="0"/>
-              <a:t>using </a:t>
-            </a:r>
-            <a:r>
-              <a:rPr lang="en-CA" sz="3300" dirty="0" err="1"/>
-              <a:t>AlphaBeta</a:t>
-            </a:r>
-            <a:endParaRPr lang="en-CA" sz="3300" dirty="0"/>
-          </a:p>
-          <a:p>
-            <a:pPr lvl="1">
-              <a:lnSpc>
-                <a:spcPct val="100000"/>
-              </a:lnSpc>
-            </a:pPr>
-            <a:r>
-              <a:rPr lang="en-CA" sz="3300" dirty="0"/>
-              <a:t>player 1 using e2() and player 2 using e1()</a:t>
-            </a:r>
-          </a:p>
-          <a:p>
-            <a:endParaRPr lang="en-CA" sz="2000" dirty="0"/>
           </a:p>
         </p:txBody>
       </p:sp>
@@ -6535,9 +6371,10 @@
           </a:bodyPr>
           <a:lstStyle/>
           <a:p>
+            <a:pPr algn="ctr"/>
             <a:r>
               <a:rPr lang="en-CA" dirty="0"/>
-              <a:t>Is player 1 cheating?!</a:t>
+              <a:t>Lets check out the results!</a:t>
             </a:r>
           </a:p>
         </p:txBody>
@@ -6812,10 +6649,10 @@
       </p:sp>
       <p:pic>
         <p:nvPicPr>
-          <p:cNvPr id="5122" name="Picture 2" descr="A brief history of cheating at video games | Engadget">
-            <a:extLst>
-              <a:ext uri="{FF2B5EF4-FFF2-40B4-BE49-F238E27FC236}">
-                <a16:creationId xmlns:a16="http://schemas.microsoft.com/office/drawing/2014/main" id="{18D730AA-AA72-4385-ABA8-21CBE90C960D}"/>
+          <p:cNvPr id="11" name="Picture 2" descr="🏆 Trophy Emoji Meaning with Pictures: from A to Z">
+            <a:extLst>
+              <a:ext uri="{FF2B5EF4-FFF2-40B4-BE49-F238E27FC236}">
+                <a16:creationId xmlns:a16="http://schemas.microsoft.com/office/drawing/2014/main" id="{E7B59317-5BD8-49E3-BF4F-460ABFE1F692}"/>
               </a:ext>
             </a:extLst>
           </p:cNvPr>
@@ -6828,6 +6665,7 @@
         </p:nvPicPr>
         <p:blipFill>
           <a:blip r:embed="rId2">
+            <a:alphaModFix/>
             <a:extLst>
               <a:ext uri="{28A0092B-C50C-407E-A947-70E740481C1C}">
                 <a14:useLocalDpi xmlns:a14="http://schemas.microsoft.com/office/drawing/2010/main" val="0"/>
@@ -6841,8 +6679,8 @@
         </p:blipFill>
         <p:spPr bwMode="auto">
           <a:xfrm>
-            <a:off x="2804464" y="1678061"/>
-            <a:ext cx="6583071" cy="4394200"/>
+            <a:off x="3920331" y="1825625"/>
+            <a:ext cx="4351338" cy="4351338"/>
           </a:xfrm>
           <a:prstGeom prst="rect">
             <a:avLst/>

</xml_diff>